<commit_message>
the idea of the program drawn out in powerpoint
</commit_message>
<xml_diff>
--- a/WesternBlotPanner.pptx
+++ b/WesternBlotPanner.pptx
@@ -110,7 +110,7 @@
 <file path=ppt/revisionInfo.xml><?xml version="1.0" encoding="utf-8"?>
 <p1510:revInfo xmlns:a="http://schemas.openxmlformats.org/drawingml/2006/main" xmlns:r="http://schemas.openxmlformats.org/officeDocument/2006/relationships" xmlns:p1510="http://schemas.microsoft.com/office/powerpoint/2015/10/main">
   <p1510:revLst>
-    <p1510:client id="{1F7B5E87-A1A7-4479-99ED-BDD91FF24020}" v="34" dt="2019-08-26T22:44:42.130"/>
+    <p1510:client id="{1F7B5E87-A1A7-4479-99ED-BDD91FF24020}" v="48" dt="2019-08-27T22:54:58.677"/>
   </p1510:revLst>
 </p1510:revInfo>
 </file>
@@ -120,12 +120,12 @@
   <pc:docChgLst>
     <pc:chgData name="PEDEN Alexander" userId="adfe817b-aabe-4a42-9b08-d2ae8028732d" providerId="ADAL" clId="{1F7B5E87-A1A7-4479-99ED-BDD91FF24020}"/>
     <pc:docChg chg="custSel addSld modSld">
-      <pc:chgData name="PEDEN Alexander" userId="adfe817b-aabe-4a42-9b08-d2ae8028732d" providerId="ADAL" clId="{1F7B5E87-A1A7-4479-99ED-BDD91FF24020}" dt="2019-08-26T22:48:01.426" v="491" actId="14100"/>
+      <pc:chgData name="PEDEN Alexander" userId="adfe817b-aabe-4a42-9b08-d2ae8028732d" providerId="ADAL" clId="{1F7B5E87-A1A7-4479-99ED-BDD91FF24020}" dt="2019-08-27T22:55:25.431" v="629" actId="20577"/>
       <pc:docMkLst>
         <pc:docMk/>
       </pc:docMkLst>
       <pc:sldChg chg="addSp delSp modSp add">
-        <pc:chgData name="PEDEN Alexander" userId="adfe817b-aabe-4a42-9b08-d2ae8028732d" providerId="ADAL" clId="{1F7B5E87-A1A7-4479-99ED-BDD91FF24020}" dt="2019-08-26T22:48:01.426" v="491" actId="14100"/>
+        <pc:chgData name="PEDEN Alexander" userId="adfe817b-aabe-4a42-9b08-d2ae8028732d" providerId="ADAL" clId="{1F7B5E87-A1A7-4479-99ED-BDD91FF24020}" dt="2019-08-27T22:55:25.431" v="629" actId="20577"/>
         <pc:sldMkLst>
           <pc:docMk/>
           <pc:sldMk cId="3829221816" sldId="256"/>
@@ -163,7 +163,7 @@
           </ac:spMkLst>
         </pc:spChg>
         <pc:spChg chg="add mod">
-          <ac:chgData name="PEDEN Alexander" userId="adfe817b-aabe-4a42-9b08-d2ae8028732d" providerId="ADAL" clId="{1F7B5E87-A1A7-4479-99ED-BDD91FF24020}" dt="2019-08-26T22:42:38.738" v="435" actId="1076"/>
+          <ac:chgData name="PEDEN Alexander" userId="adfe817b-aabe-4a42-9b08-d2ae8028732d" providerId="ADAL" clId="{1F7B5E87-A1A7-4479-99ED-BDD91FF24020}" dt="2019-08-27T22:50:36.039" v="511" actId="1038"/>
           <ac:spMkLst>
             <pc:docMk/>
             <pc:sldMk cId="3829221816" sldId="256"/>
@@ -242,6 +242,38 @@
             <ac:spMk id="82" creationId="{27BA25F3-30B1-45AE-82A4-81F04C3DE3EC}"/>
           </ac:spMkLst>
         </pc:spChg>
+        <pc:spChg chg="add mod">
+          <ac:chgData name="PEDEN Alexander" userId="adfe817b-aabe-4a42-9b08-d2ae8028732d" providerId="ADAL" clId="{1F7B5E87-A1A7-4479-99ED-BDD91FF24020}" dt="2019-08-27T22:52:06.699" v="576" actId="1076"/>
+          <ac:spMkLst>
+            <pc:docMk/>
+            <pc:sldMk cId="3829221816" sldId="256"/>
+            <ac:spMk id="109" creationId="{262BCE13-0E25-4A01-9C48-52EFFC2604CB}"/>
+          </ac:spMkLst>
+        </pc:spChg>
+        <pc:spChg chg="add mod">
+          <ac:chgData name="PEDEN Alexander" userId="adfe817b-aabe-4a42-9b08-d2ae8028732d" providerId="ADAL" clId="{1F7B5E87-A1A7-4479-99ED-BDD91FF24020}" dt="2019-08-27T22:51:51.767" v="572" actId="14100"/>
+          <ac:spMkLst>
+            <pc:docMk/>
+            <pc:sldMk cId="3829221816" sldId="256"/>
+            <ac:spMk id="110" creationId="{06C0F628-78C7-4DC5-8DAB-0BC1923EA229}"/>
+          </ac:spMkLst>
+        </pc:spChg>
+        <pc:spChg chg="add mod">
+          <ac:chgData name="PEDEN Alexander" userId="adfe817b-aabe-4a42-9b08-d2ae8028732d" providerId="ADAL" clId="{1F7B5E87-A1A7-4479-99ED-BDD91FF24020}" dt="2019-08-27T22:52:10.203" v="577" actId="14100"/>
+          <ac:spMkLst>
+            <pc:docMk/>
+            <pc:sldMk cId="3829221816" sldId="256"/>
+            <ac:spMk id="111" creationId="{008B7BC1-4ABB-4CEB-9ED7-C9D228C0F1AF}"/>
+          </ac:spMkLst>
+        </pc:spChg>
+        <pc:spChg chg="add mod">
+          <ac:chgData name="PEDEN Alexander" userId="adfe817b-aabe-4a42-9b08-d2ae8028732d" providerId="ADAL" clId="{1F7B5E87-A1A7-4479-99ED-BDD91FF24020}" dt="2019-08-27T22:55:25.431" v="629" actId="20577"/>
+          <ac:spMkLst>
+            <pc:docMk/>
+            <pc:sldMk cId="3829221816" sldId="256"/>
+            <ac:spMk id="138" creationId="{F6EFF973-635C-41A6-9AD1-348BECAB0E48}"/>
+          </ac:spMkLst>
+        </pc:spChg>
         <pc:cxnChg chg="add del mod">
           <ac:chgData name="PEDEN Alexander" userId="adfe817b-aabe-4a42-9b08-d2ae8028732d" providerId="ADAL" clId="{1F7B5E87-A1A7-4479-99ED-BDD91FF24020}" dt="2019-08-26T22:05:37.319" v="256" actId="478"/>
           <ac:cxnSpMkLst>
@@ -291,7 +323,7 @@
           </ac:cxnSpMkLst>
         </pc:cxnChg>
         <pc:cxnChg chg="add mod">
-          <ac:chgData name="PEDEN Alexander" userId="adfe817b-aabe-4a42-9b08-d2ae8028732d" providerId="ADAL" clId="{1F7B5E87-A1A7-4479-99ED-BDD91FF24020}" dt="2019-08-26T22:42:38.738" v="435" actId="1076"/>
+          <ac:chgData name="PEDEN Alexander" userId="adfe817b-aabe-4a42-9b08-d2ae8028732d" providerId="ADAL" clId="{1F7B5E87-A1A7-4479-99ED-BDD91FF24020}" dt="2019-08-27T22:50:36.039" v="511" actId="1038"/>
           <ac:cxnSpMkLst>
             <pc:docMk/>
             <pc:sldMk cId="3829221816" sldId="256"/>
@@ -299,7 +331,7 @@
           </ac:cxnSpMkLst>
         </pc:cxnChg>
         <pc:cxnChg chg="add mod">
-          <ac:chgData name="PEDEN Alexander" userId="adfe817b-aabe-4a42-9b08-d2ae8028732d" providerId="ADAL" clId="{1F7B5E87-A1A7-4479-99ED-BDD91FF24020}" dt="2019-08-26T22:47:07.684" v="486" actId="1076"/>
+          <ac:chgData name="PEDEN Alexander" userId="adfe817b-aabe-4a42-9b08-d2ae8028732d" providerId="ADAL" clId="{1F7B5E87-A1A7-4479-99ED-BDD91FF24020}" dt="2019-08-27T22:52:31.692" v="580" actId="14100"/>
           <ac:cxnSpMkLst>
             <pc:docMk/>
             <pc:sldMk cId="3829221816" sldId="256"/>
@@ -371,7 +403,7 @@
           </ac:cxnSpMkLst>
         </pc:cxnChg>
         <pc:cxnChg chg="add mod">
-          <ac:chgData name="PEDEN Alexander" userId="adfe817b-aabe-4a42-9b08-d2ae8028732d" providerId="ADAL" clId="{1F7B5E87-A1A7-4479-99ED-BDD91FF24020}" dt="2019-08-26T22:45:44.693" v="480" actId="1076"/>
+          <ac:chgData name="PEDEN Alexander" userId="adfe817b-aabe-4a42-9b08-d2ae8028732d" providerId="ADAL" clId="{1F7B5E87-A1A7-4479-99ED-BDD91FF24020}" dt="2019-08-27T22:52:20.231" v="578" actId="14100"/>
           <ac:cxnSpMkLst>
             <pc:docMk/>
             <pc:sldMk cId="3829221816" sldId="256"/>
@@ -400,6 +432,86 @@
             <pc:docMk/>
             <pc:sldMk cId="3829221816" sldId="256"/>
             <ac:cxnSpMk id="90" creationId="{CD4B8DA9-02AE-48B8-918F-D42721D26E29}"/>
+          </ac:cxnSpMkLst>
+        </pc:cxnChg>
+        <pc:cxnChg chg="add mod">
+          <ac:chgData name="PEDEN Alexander" userId="adfe817b-aabe-4a42-9b08-d2ae8028732d" providerId="ADAL" clId="{1F7B5E87-A1A7-4479-99ED-BDD91FF24020}" dt="2019-08-27T22:52:39.415" v="583" actId="14100"/>
+          <ac:cxnSpMkLst>
+            <pc:docMk/>
+            <pc:sldMk cId="3829221816" sldId="256"/>
+            <ac:cxnSpMk id="115" creationId="{3009F944-490A-43C7-96F3-5D8EBA7B95DF}"/>
+          </ac:cxnSpMkLst>
+        </pc:cxnChg>
+        <pc:cxnChg chg="add mod">
+          <ac:chgData name="PEDEN Alexander" userId="adfe817b-aabe-4a42-9b08-d2ae8028732d" providerId="ADAL" clId="{1F7B5E87-A1A7-4479-99ED-BDD91FF24020}" dt="2019-08-27T22:52:54.001" v="586" actId="14100"/>
+          <ac:cxnSpMkLst>
+            <pc:docMk/>
+            <pc:sldMk cId="3829221816" sldId="256"/>
+            <ac:cxnSpMk id="118" creationId="{A3B23DC5-1373-44C3-8073-C677856D6777}"/>
+          </ac:cxnSpMkLst>
+        </pc:cxnChg>
+        <pc:cxnChg chg="add mod">
+          <ac:chgData name="PEDEN Alexander" userId="adfe817b-aabe-4a42-9b08-d2ae8028732d" providerId="ADAL" clId="{1F7B5E87-A1A7-4479-99ED-BDD91FF24020}" dt="2019-08-27T22:53:32.259" v="594" actId="14100"/>
+          <ac:cxnSpMkLst>
+            <pc:docMk/>
+            <pc:sldMk cId="3829221816" sldId="256"/>
+            <ac:cxnSpMk id="121" creationId="{9D5D32DF-1BC7-470E-93B8-C601B2A2B2E2}"/>
+          </ac:cxnSpMkLst>
+        </pc:cxnChg>
+        <pc:cxnChg chg="add mod">
+          <ac:chgData name="PEDEN Alexander" userId="adfe817b-aabe-4a42-9b08-d2ae8028732d" providerId="ADAL" clId="{1F7B5E87-A1A7-4479-99ED-BDD91FF24020}" dt="2019-08-27T22:53:27.325" v="593" actId="14100"/>
+          <ac:cxnSpMkLst>
+            <pc:docMk/>
+            <pc:sldMk cId="3829221816" sldId="256"/>
+            <ac:cxnSpMk id="124" creationId="{0AE8F81F-FD06-496D-B529-51FE987AF93C}"/>
+          </ac:cxnSpMkLst>
+        </pc:cxnChg>
+        <pc:cxnChg chg="add mod">
+          <ac:chgData name="PEDEN Alexander" userId="adfe817b-aabe-4a42-9b08-d2ae8028732d" providerId="ADAL" clId="{1F7B5E87-A1A7-4479-99ED-BDD91FF24020}" dt="2019-08-27T22:53:49.093" v="597" actId="14100"/>
+          <ac:cxnSpMkLst>
+            <pc:docMk/>
+            <pc:sldMk cId="3829221816" sldId="256"/>
+            <ac:cxnSpMk id="129" creationId="{151C6FB7-6ABE-4AA7-A4E9-E053BDA2C76B}"/>
+          </ac:cxnSpMkLst>
+        </pc:cxnChg>
+        <pc:cxnChg chg="add mod">
+          <ac:chgData name="PEDEN Alexander" userId="adfe817b-aabe-4a42-9b08-d2ae8028732d" providerId="ADAL" clId="{1F7B5E87-A1A7-4479-99ED-BDD91FF24020}" dt="2019-08-27T22:53:56.812" v="600" actId="14100"/>
+          <ac:cxnSpMkLst>
+            <pc:docMk/>
+            <pc:sldMk cId="3829221816" sldId="256"/>
+            <ac:cxnSpMk id="132" creationId="{A273DC06-D83E-4121-ADEB-A0A4849FEA2C}"/>
+          </ac:cxnSpMkLst>
+        </pc:cxnChg>
+        <pc:cxnChg chg="add mod">
+          <ac:chgData name="PEDEN Alexander" userId="adfe817b-aabe-4a42-9b08-d2ae8028732d" providerId="ADAL" clId="{1F7B5E87-A1A7-4479-99ED-BDD91FF24020}" dt="2019-08-27T22:54:04.778" v="603" actId="14100"/>
+          <ac:cxnSpMkLst>
+            <pc:docMk/>
+            <pc:sldMk cId="3829221816" sldId="256"/>
+            <ac:cxnSpMk id="135" creationId="{D914123E-6477-4FD0-928B-5A1519744FD8}"/>
+          </ac:cxnSpMkLst>
+        </pc:cxnChg>
+        <pc:cxnChg chg="add mod">
+          <ac:chgData name="PEDEN Alexander" userId="adfe817b-aabe-4a42-9b08-d2ae8028732d" providerId="ADAL" clId="{1F7B5E87-A1A7-4479-99ED-BDD91FF24020}" dt="2019-08-27T22:54:46.776" v="609" actId="14100"/>
+          <ac:cxnSpMkLst>
+            <pc:docMk/>
+            <pc:sldMk cId="3829221816" sldId="256"/>
+            <ac:cxnSpMk id="139" creationId="{58775D77-A9D5-49E1-A48E-F39D0B87EDE0}"/>
+          </ac:cxnSpMkLst>
+        </pc:cxnChg>
+        <pc:cxnChg chg="add mod">
+          <ac:chgData name="PEDEN Alexander" userId="adfe817b-aabe-4a42-9b08-d2ae8028732d" providerId="ADAL" clId="{1F7B5E87-A1A7-4479-99ED-BDD91FF24020}" dt="2019-08-27T22:54:57.405" v="612" actId="14100"/>
+          <ac:cxnSpMkLst>
+            <pc:docMk/>
+            <pc:sldMk cId="3829221816" sldId="256"/>
+            <ac:cxnSpMk id="143" creationId="{6474ED06-91CE-40D6-859F-D4611E383E93}"/>
+          </ac:cxnSpMkLst>
+        </pc:cxnChg>
+        <pc:cxnChg chg="add mod">
+          <ac:chgData name="PEDEN Alexander" userId="adfe817b-aabe-4a42-9b08-d2ae8028732d" providerId="ADAL" clId="{1F7B5E87-A1A7-4479-99ED-BDD91FF24020}" dt="2019-08-27T22:55:05.643" v="615" actId="14100"/>
+          <ac:cxnSpMkLst>
+            <pc:docMk/>
+            <pc:sldMk cId="3829221816" sldId="256"/>
+            <ac:cxnSpMk id="146" creationId="{18511CE0-BD61-4327-9E6E-62B2FDCC7C07}"/>
           </ac:cxnSpMkLst>
         </pc:cxnChg>
       </pc:sldChg>
@@ -3711,7 +3823,7 @@
         </p:nvSpPr>
         <p:spPr>
           <a:xfrm>
-            <a:off x="3400964" y="3047029"/>
+            <a:off x="2800072" y="3047029"/>
             <a:ext cx="914400" cy="1278949"/>
           </a:xfrm>
           <a:prstGeom prst="roundRect">
@@ -4130,8 +4242,8 @@
         </p:nvCxnSpPr>
         <p:spPr>
           <a:xfrm rot="16200000" flipH="1">
-            <a:off x="2553620" y="2839159"/>
-            <a:ext cx="947785" cy="746904"/>
+            <a:off x="2253174" y="3139605"/>
+            <a:ext cx="947785" cy="146012"/>
           </a:xfrm>
           <a:prstGeom prst="bentConnector2">
             <a:avLst/>
@@ -4166,15 +4278,15 @@
           </p:cNvPr>
           <p:cNvCxnSpPr>
             <a:cxnSpLocks/>
-            <a:stCxn id="6" idx="3"/>
-            <a:endCxn id="47" idx="1"/>
+            <a:stCxn id="110" idx="3"/>
+            <a:endCxn id="82" idx="1"/>
           </p:cNvCxnSpPr>
           <p:nvPr/>
         </p:nvCxnSpPr>
         <p:spPr>
-          <a:xfrm>
-            <a:off x="4315364" y="3686504"/>
-            <a:ext cx="381181" cy="881015"/>
+          <a:xfrm flipV="1">
+            <a:off x="3513295" y="2626659"/>
+            <a:ext cx="1183250" cy="2874440"/>
           </a:xfrm>
           <a:prstGeom prst="bentConnector3">
             <a:avLst>
@@ -4828,15 +4940,15 @@
           </p:cNvPr>
           <p:cNvCxnSpPr>
             <a:cxnSpLocks/>
-            <a:stCxn id="6" idx="3"/>
+            <a:stCxn id="109" idx="3"/>
             <a:endCxn id="82" idx="1"/>
           </p:cNvCxnSpPr>
           <p:nvPr/>
         </p:nvCxnSpPr>
         <p:spPr>
           <a:xfrm flipV="1">
-            <a:off x="4315364" y="2626659"/>
-            <a:ext cx="381181" cy="1059845"/>
+            <a:off x="3474503" y="2626659"/>
+            <a:ext cx="1222042" cy="2486846"/>
           </a:xfrm>
           <a:prstGeom prst="bentConnector3">
             <a:avLst>
@@ -4976,6 +5088,681 @@
           <a:prstGeom prst="bentConnector3">
             <a:avLst>
               <a:gd name="adj1" fmla="val 31732"/>
+            </a:avLst>
+          </a:prstGeom>
+          <a:ln>
+            <a:tailEnd type="triangle"/>
+          </a:ln>
+        </p:spPr>
+        <p:style>
+          <a:lnRef idx="1">
+            <a:schemeClr val="accent1"/>
+          </a:lnRef>
+          <a:fillRef idx="0">
+            <a:schemeClr val="accent1"/>
+          </a:fillRef>
+          <a:effectRef idx="0">
+            <a:schemeClr val="accent1"/>
+          </a:effectRef>
+          <a:fontRef idx="minor">
+            <a:schemeClr val="tx1"/>
+          </a:fontRef>
+        </p:style>
+      </p:cxnSp>
+      <p:sp>
+        <p:nvSpPr>
+          <p:cNvPr id="109" name="Rectangle: Rounded Corners 108">
+            <a:extLst>
+              <a:ext uri="{FF2B5EF4-FFF2-40B4-BE49-F238E27FC236}">
+                <a16:creationId xmlns:a16="http://schemas.microsoft.com/office/drawing/2014/main" id="{262BCE13-0E25-4A01-9C48-52EFFC2604CB}"/>
+              </a:ext>
+            </a:extLst>
+          </p:cNvPr>
+          <p:cNvSpPr/>
+          <p:nvPr/>
+        </p:nvSpPr>
+        <p:spPr>
+          <a:xfrm>
+            <a:off x="2295114" y="4992734"/>
+            <a:ext cx="1179389" cy="241541"/>
+          </a:xfrm>
+          <a:prstGeom prst="roundRect">
+            <a:avLst/>
+          </a:prstGeom>
+          <a:solidFill>
+            <a:schemeClr val="bg1">
+              <a:lumMod val="75000"/>
+            </a:schemeClr>
+          </a:solidFill>
+        </p:spPr>
+        <p:style>
+          <a:lnRef idx="2">
+            <a:schemeClr val="accent1">
+              <a:shade val="50000"/>
+            </a:schemeClr>
+          </a:lnRef>
+          <a:fillRef idx="1">
+            <a:schemeClr val="accent1"/>
+          </a:fillRef>
+          <a:effectRef idx="0">
+            <a:schemeClr val="accent1"/>
+          </a:effectRef>
+          <a:fontRef idx="minor">
+            <a:schemeClr val="lt1"/>
+          </a:fontRef>
+        </p:style>
+        <p:txBody>
+          <a:bodyPr rtlCol="0" anchor="ctr"/>
+          <a:lstStyle/>
+          <a:p>
+            <a:pPr algn="ctr"/>
+            <a:r>
+              <a:rPr lang="en-GB" dirty="0"/>
+              <a:t>Markers</a:t>
+            </a:r>
+          </a:p>
+        </p:txBody>
+      </p:sp>
+      <p:sp>
+        <p:nvSpPr>
+          <p:cNvPr id="110" name="Rectangle: Rounded Corners 109">
+            <a:extLst>
+              <a:ext uri="{FF2B5EF4-FFF2-40B4-BE49-F238E27FC236}">
+                <a16:creationId xmlns:a16="http://schemas.microsoft.com/office/drawing/2014/main" id="{06C0F628-78C7-4DC5-8DAB-0BC1923EA229}"/>
+              </a:ext>
+            </a:extLst>
+          </p:cNvPr>
+          <p:cNvSpPr/>
+          <p:nvPr/>
+        </p:nvSpPr>
+        <p:spPr>
+          <a:xfrm>
+            <a:off x="2295114" y="5398231"/>
+            <a:ext cx="1218181" cy="205735"/>
+          </a:xfrm>
+          <a:prstGeom prst="roundRect">
+            <a:avLst/>
+          </a:prstGeom>
+          <a:solidFill>
+            <a:schemeClr val="bg1">
+              <a:lumMod val="75000"/>
+            </a:schemeClr>
+          </a:solidFill>
+        </p:spPr>
+        <p:style>
+          <a:lnRef idx="2">
+            <a:schemeClr val="accent1">
+              <a:shade val="50000"/>
+            </a:schemeClr>
+          </a:lnRef>
+          <a:fillRef idx="1">
+            <a:schemeClr val="accent1"/>
+          </a:fillRef>
+          <a:effectRef idx="0">
+            <a:schemeClr val="accent1"/>
+          </a:effectRef>
+          <a:fontRef idx="minor">
+            <a:schemeClr val="lt1"/>
+          </a:fontRef>
+        </p:style>
+        <p:txBody>
+          <a:bodyPr rtlCol="0" anchor="ctr"/>
+          <a:lstStyle/>
+          <a:p>
+            <a:pPr algn="ctr"/>
+            <a:r>
+              <a:rPr lang="en-GB" dirty="0"/>
+              <a:t>Controls</a:t>
+            </a:r>
+          </a:p>
+        </p:txBody>
+      </p:sp>
+      <p:sp>
+        <p:nvSpPr>
+          <p:cNvPr id="111" name="Rectangle: Rounded Corners 110">
+            <a:extLst>
+              <a:ext uri="{FF2B5EF4-FFF2-40B4-BE49-F238E27FC236}">
+                <a16:creationId xmlns:a16="http://schemas.microsoft.com/office/drawing/2014/main" id="{008B7BC1-4ABB-4CEB-9ED7-C9D228C0F1AF}"/>
+              </a:ext>
+            </a:extLst>
+          </p:cNvPr>
+          <p:cNvSpPr/>
+          <p:nvPr/>
+        </p:nvSpPr>
+        <p:spPr>
+          <a:xfrm>
+            <a:off x="2295114" y="5776504"/>
+            <a:ext cx="1218181" cy="297725"/>
+          </a:xfrm>
+          <a:prstGeom prst="roundRect">
+            <a:avLst/>
+          </a:prstGeom>
+          <a:solidFill>
+            <a:schemeClr val="bg1">
+              <a:lumMod val="75000"/>
+            </a:schemeClr>
+          </a:solidFill>
+        </p:spPr>
+        <p:style>
+          <a:lnRef idx="2">
+            <a:schemeClr val="accent1">
+              <a:shade val="50000"/>
+            </a:schemeClr>
+          </a:lnRef>
+          <a:fillRef idx="1">
+            <a:schemeClr val="accent1"/>
+          </a:fillRef>
+          <a:effectRef idx="0">
+            <a:schemeClr val="accent1"/>
+          </a:effectRef>
+          <a:fontRef idx="minor">
+            <a:schemeClr val="lt1"/>
+          </a:fontRef>
+        </p:style>
+        <p:txBody>
+          <a:bodyPr rtlCol="0" anchor="ctr"/>
+          <a:lstStyle/>
+          <a:p>
+            <a:pPr algn="ctr"/>
+            <a:r>
+              <a:rPr lang="en-GB" dirty="0"/>
+              <a:t>Standards</a:t>
+            </a:r>
+          </a:p>
+        </p:txBody>
+      </p:sp>
+      <p:cxnSp>
+        <p:nvCxnSpPr>
+          <p:cNvPr id="115" name="Connector: Elbow 114">
+            <a:extLst>
+              <a:ext uri="{FF2B5EF4-FFF2-40B4-BE49-F238E27FC236}">
+                <a16:creationId xmlns:a16="http://schemas.microsoft.com/office/drawing/2014/main" id="{3009F944-490A-43C7-96F3-5D8EBA7B95DF}"/>
+              </a:ext>
+            </a:extLst>
+          </p:cNvPr>
+          <p:cNvCxnSpPr>
+            <a:cxnSpLocks/>
+            <a:stCxn id="111" idx="3"/>
+            <a:endCxn id="82" idx="1"/>
+          </p:cNvCxnSpPr>
+          <p:nvPr/>
+        </p:nvCxnSpPr>
+        <p:spPr>
+          <a:xfrm flipV="1">
+            <a:off x="3513295" y="2626659"/>
+            <a:ext cx="1183250" cy="3298708"/>
+          </a:xfrm>
+          <a:prstGeom prst="bentConnector3">
+            <a:avLst>
+              <a:gd name="adj1" fmla="val 50000"/>
+            </a:avLst>
+          </a:prstGeom>
+          <a:ln>
+            <a:tailEnd type="triangle"/>
+          </a:ln>
+        </p:spPr>
+        <p:style>
+          <a:lnRef idx="1">
+            <a:schemeClr val="accent1"/>
+          </a:lnRef>
+          <a:fillRef idx="0">
+            <a:schemeClr val="accent1"/>
+          </a:fillRef>
+          <a:effectRef idx="0">
+            <a:schemeClr val="accent1"/>
+          </a:effectRef>
+          <a:fontRef idx="minor">
+            <a:schemeClr val="tx1"/>
+          </a:fontRef>
+        </p:style>
+      </p:cxnSp>
+      <p:cxnSp>
+        <p:nvCxnSpPr>
+          <p:cNvPr id="118" name="Connector: Elbow 117">
+            <a:extLst>
+              <a:ext uri="{FF2B5EF4-FFF2-40B4-BE49-F238E27FC236}">
+                <a16:creationId xmlns:a16="http://schemas.microsoft.com/office/drawing/2014/main" id="{A3B23DC5-1373-44C3-8073-C677856D6777}"/>
+              </a:ext>
+            </a:extLst>
+          </p:cNvPr>
+          <p:cNvCxnSpPr>
+            <a:cxnSpLocks/>
+            <a:stCxn id="6" idx="3"/>
+            <a:endCxn id="109" idx="1"/>
+          </p:cNvCxnSpPr>
+          <p:nvPr/>
+        </p:nvCxnSpPr>
+        <p:spPr>
+          <a:xfrm flipH="1">
+            <a:off x="2295114" y="3686504"/>
+            <a:ext cx="1419358" cy="1427001"/>
+          </a:xfrm>
+          <a:prstGeom prst="bentConnector5">
+            <a:avLst>
+              <a:gd name="adj1" fmla="val -16106"/>
+              <a:gd name="adj2" fmla="val 68175"/>
+              <a:gd name="adj3" fmla="val 116106"/>
+            </a:avLst>
+          </a:prstGeom>
+          <a:ln>
+            <a:tailEnd type="triangle"/>
+          </a:ln>
+        </p:spPr>
+        <p:style>
+          <a:lnRef idx="1">
+            <a:schemeClr val="accent1"/>
+          </a:lnRef>
+          <a:fillRef idx="0">
+            <a:schemeClr val="accent1"/>
+          </a:fillRef>
+          <a:effectRef idx="0">
+            <a:schemeClr val="accent1"/>
+          </a:effectRef>
+          <a:fontRef idx="minor">
+            <a:schemeClr val="tx1"/>
+          </a:fontRef>
+        </p:style>
+      </p:cxnSp>
+      <p:cxnSp>
+        <p:nvCxnSpPr>
+          <p:cNvPr id="121" name="Connector: Elbow 120">
+            <a:extLst>
+              <a:ext uri="{FF2B5EF4-FFF2-40B4-BE49-F238E27FC236}">
+                <a16:creationId xmlns:a16="http://schemas.microsoft.com/office/drawing/2014/main" id="{9D5D32DF-1BC7-470E-93B8-C601B2A2B2E2}"/>
+              </a:ext>
+            </a:extLst>
+          </p:cNvPr>
+          <p:cNvCxnSpPr>
+            <a:cxnSpLocks/>
+            <a:stCxn id="6" idx="3"/>
+            <a:endCxn id="110" idx="1"/>
+          </p:cNvCxnSpPr>
+          <p:nvPr/>
+        </p:nvCxnSpPr>
+        <p:spPr>
+          <a:xfrm flipH="1">
+            <a:off x="2295114" y="3686504"/>
+            <a:ext cx="1419358" cy="1814595"/>
+          </a:xfrm>
+          <a:prstGeom prst="bentConnector5">
+            <a:avLst>
+              <a:gd name="adj1" fmla="val -16106"/>
+              <a:gd name="adj2" fmla="val 54708"/>
+              <a:gd name="adj3" fmla="val 116106"/>
+            </a:avLst>
+          </a:prstGeom>
+          <a:ln>
+            <a:tailEnd type="triangle"/>
+          </a:ln>
+        </p:spPr>
+        <p:style>
+          <a:lnRef idx="1">
+            <a:schemeClr val="accent1"/>
+          </a:lnRef>
+          <a:fillRef idx="0">
+            <a:schemeClr val="accent1"/>
+          </a:fillRef>
+          <a:effectRef idx="0">
+            <a:schemeClr val="accent1"/>
+          </a:effectRef>
+          <a:fontRef idx="minor">
+            <a:schemeClr val="tx1"/>
+          </a:fontRef>
+        </p:style>
+      </p:cxnSp>
+      <p:cxnSp>
+        <p:nvCxnSpPr>
+          <p:cNvPr id="124" name="Connector: Elbow 123">
+            <a:extLst>
+              <a:ext uri="{FF2B5EF4-FFF2-40B4-BE49-F238E27FC236}">
+                <a16:creationId xmlns:a16="http://schemas.microsoft.com/office/drawing/2014/main" id="{0AE8F81F-FD06-496D-B529-51FE987AF93C}"/>
+              </a:ext>
+            </a:extLst>
+          </p:cNvPr>
+          <p:cNvCxnSpPr>
+            <a:cxnSpLocks/>
+            <a:stCxn id="6" idx="3"/>
+            <a:endCxn id="111" idx="1"/>
+          </p:cNvCxnSpPr>
+          <p:nvPr/>
+        </p:nvCxnSpPr>
+        <p:spPr>
+          <a:xfrm flipH="1">
+            <a:off x="2295114" y="3686504"/>
+            <a:ext cx="1419358" cy="2238863"/>
+          </a:xfrm>
+          <a:prstGeom prst="bentConnector5">
+            <a:avLst>
+              <a:gd name="adj1" fmla="val -16106"/>
+              <a:gd name="adj2" fmla="val 44037"/>
+              <a:gd name="adj3" fmla="val 116106"/>
+            </a:avLst>
+          </a:prstGeom>
+          <a:ln>
+            <a:tailEnd type="triangle"/>
+          </a:ln>
+        </p:spPr>
+        <p:style>
+          <a:lnRef idx="1">
+            <a:schemeClr val="accent1"/>
+          </a:lnRef>
+          <a:fillRef idx="0">
+            <a:schemeClr val="accent1"/>
+          </a:fillRef>
+          <a:effectRef idx="0">
+            <a:schemeClr val="accent1"/>
+          </a:effectRef>
+          <a:fontRef idx="minor">
+            <a:schemeClr val="tx1"/>
+          </a:fontRef>
+        </p:style>
+      </p:cxnSp>
+      <p:cxnSp>
+        <p:nvCxnSpPr>
+          <p:cNvPr id="129" name="Connector: Elbow 128">
+            <a:extLst>
+              <a:ext uri="{FF2B5EF4-FFF2-40B4-BE49-F238E27FC236}">
+                <a16:creationId xmlns:a16="http://schemas.microsoft.com/office/drawing/2014/main" id="{151C6FB7-6ABE-4AA7-A4E9-E053BDA2C76B}"/>
+              </a:ext>
+            </a:extLst>
+          </p:cNvPr>
+          <p:cNvCxnSpPr>
+            <a:cxnSpLocks/>
+            <a:stCxn id="109" idx="3"/>
+            <a:endCxn id="47" idx="1"/>
+          </p:cNvCxnSpPr>
+          <p:nvPr/>
+        </p:nvCxnSpPr>
+        <p:spPr>
+          <a:xfrm flipV="1">
+            <a:off x="3474503" y="4567519"/>
+            <a:ext cx="1222042" cy="545986"/>
+          </a:xfrm>
+          <a:prstGeom prst="bentConnector3">
+            <a:avLst>
+              <a:gd name="adj1" fmla="val 50000"/>
+            </a:avLst>
+          </a:prstGeom>
+          <a:ln>
+            <a:tailEnd type="triangle"/>
+          </a:ln>
+        </p:spPr>
+        <p:style>
+          <a:lnRef idx="1">
+            <a:schemeClr val="accent1"/>
+          </a:lnRef>
+          <a:fillRef idx="0">
+            <a:schemeClr val="accent1"/>
+          </a:fillRef>
+          <a:effectRef idx="0">
+            <a:schemeClr val="accent1"/>
+          </a:effectRef>
+          <a:fontRef idx="minor">
+            <a:schemeClr val="tx1"/>
+          </a:fontRef>
+        </p:style>
+      </p:cxnSp>
+      <p:cxnSp>
+        <p:nvCxnSpPr>
+          <p:cNvPr id="132" name="Connector: Elbow 131">
+            <a:extLst>
+              <a:ext uri="{FF2B5EF4-FFF2-40B4-BE49-F238E27FC236}">
+                <a16:creationId xmlns:a16="http://schemas.microsoft.com/office/drawing/2014/main" id="{A273DC06-D83E-4121-ADEB-A0A4849FEA2C}"/>
+              </a:ext>
+            </a:extLst>
+          </p:cNvPr>
+          <p:cNvCxnSpPr>
+            <a:cxnSpLocks/>
+            <a:stCxn id="110" idx="3"/>
+            <a:endCxn id="47" idx="1"/>
+          </p:cNvCxnSpPr>
+          <p:nvPr/>
+        </p:nvCxnSpPr>
+        <p:spPr>
+          <a:xfrm flipV="1">
+            <a:off x="3513295" y="4567519"/>
+            <a:ext cx="1183250" cy="933580"/>
+          </a:xfrm>
+          <a:prstGeom prst="bentConnector3">
+            <a:avLst>
+              <a:gd name="adj1" fmla="val 50000"/>
+            </a:avLst>
+          </a:prstGeom>
+          <a:ln>
+            <a:tailEnd type="triangle"/>
+          </a:ln>
+        </p:spPr>
+        <p:style>
+          <a:lnRef idx="1">
+            <a:schemeClr val="accent1"/>
+          </a:lnRef>
+          <a:fillRef idx="0">
+            <a:schemeClr val="accent1"/>
+          </a:fillRef>
+          <a:effectRef idx="0">
+            <a:schemeClr val="accent1"/>
+          </a:effectRef>
+          <a:fontRef idx="minor">
+            <a:schemeClr val="tx1"/>
+          </a:fontRef>
+        </p:style>
+      </p:cxnSp>
+      <p:cxnSp>
+        <p:nvCxnSpPr>
+          <p:cNvPr id="135" name="Connector: Elbow 134">
+            <a:extLst>
+              <a:ext uri="{FF2B5EF4-FFF2-40B4-BE49-F238E27FC236}">
+                <a16:creationId xmlns:a16="http://schemas.microsoft.com/office/drawing/2014/main" id="{D914123E-6477-4FD0-928B-5A1519744FD8}"/>
+              </a:ext>
+            </a:extLst>
+          </p:cNvPr>
+          <p:cNvCxnSpPr>
+            <a:cxnSpLocks/>
+            <a:stCxn id="111" idx="3"/>
+            <a:endCxn id="47" idx="1"/>
+          </p:cNvCxnSpPr>
+          <p:nvPr/>
+        </p:nvCxnSpPr>
+        <p:spPr>
+          <a:xfrm flipV="1">
+            <a:off x="3513295" y="4567519"/>
+            <a:ext cx="1183250" cy="1357848"/>
+          </a:xfrm>
+          <a:prstGeom prst="bentConnector3">
+            <a:avLst>
+              <a:gd name="adj1" fmla="val 50000"/>
+            </a:avLst>
+          </a:prstGeom>
+          <a:ln>
+            <a:tailEnd type="triangle"/>
+          </a:ln>
+        </p:spPr>
+        <p:style>
+          <a:lnRef idx="1">
+            <a:schemeClr val="accent1"/>
+          </a:lnRef>
+          <a:fillRef idx="0">
+            <a:schemeClr val="accent1"/>
+          </a:fillRef>
+          <a:effectRef idx="0">
+            <a:schemeClr val="accent1"/>
+          </a:effectRef>
+          <a:fontRef idx="minor">
+            <a:schemeClr val="tx1"/>
+          </a:fontRef>
+        </p:style>
+      </p:cxnSp>
+      <p:sp>
+        <p:nvSpPr>
+          <p:cNvPr id="138" name="Rectangle: Rounded Corners 137">
+            <a:extLst>
+              <a:ext uri="{FF2B5EF4-FFF2-40B4-BE49-F238E27FC236}">
+                <a16:creationId xmlns:a16="http://schemas.microsoft.com/office/drawing/2014/main" id="{F6EFF973-635C-41A6-9AD1-348BECAB0E48}"/>
+              </a:ext>
+            </a:extLst>
+          </p:cNvPr>
+          <p:cNvSpPr/>
+          <p:nvPr/>
+        </p:nvSpPr>
+        <p:spPr>
+          <a:xfrm>
+            <a:off x="2295114" y="6280756"/>
+            <a:ext cx="1218181" cy="297725"/>
+          </a:xfrm>
+          <a:prstGeom prst="roundRect">
+            <a:avLst/>
+          </a:prstGeom>
+          <a:solidFill>
+            <a:schemeClr val="bg1">
+              <a:lumMod val="75000"/>
+            </a:schemeClr>
+          </a:solidFill>
+        </p:spPr>
+        <p:style>
+          <a:lnRef idx="2">
+            <a:schemeClr val="accent1">
+              <a:shade val="50000"/>
+            </a:schemeClr>
+          </a:lnRef>
+          <a:fillRef idx="1">
+            <a:schemeClr val="accent1"/>
+          </a:fillRef>
+          <a:effectRef idx="0">
+            <a:schemeClr val="accent1"/>
+          </a:effectRef>
+          <a:fontRef idx="minor">
+            <a:schemeClr val="lt1"/>
+          </a:fontRef>
+        </p:style>
+        <p:txBody>
+          <a:bodyPr rtlCol="0" anchor="ctr"/>
+          <a:lstStyle/>
+          <a:p>
+            <a:pPr algn="ctr"/>
+            <a:r>
+              <a:rPr lang="en-GB"/>
+              <a:t>tests</a:t>
+            </a:r>
+            <a:endParaRPr lang="en-GB" dirty="0"/>
+          </a:p>
+        </p:txBody>
+      </p:sp>
+      <p:cxnSp>
+        <p:nvCxnSpPr>
+          <p:cNvPr id="139" name="Connector: Elbow 138">
+            <a:extLst>
+              <a:ext uri="{FF2B5EF4-FFF2-40B4-BE49-F238E27FC236}">
+                <a16:creationId xmlns:a16="http://schemas.microsoft.com/office/drawing/2014/main" id="{58775D77-A9D5-49E1-A48E-F39D0B87EDE0}"/>
+              </a:ext>
+            </a:extLst>
+          </p:cNvPr>
+          <p:cNvCxnSpPr>
+            <a:cxnSpLocks/>
+            <a:stCxn id="6" idx="3"/>
+            <a:endCxn id="138" idx="1"/>
+          </p:cNvCxnSpPr>
+          <p:nvPr/>
+        </p:nvCxnSpPr>
+        <p:spPr>
+          <a:xfrm flipH="1">
+            <a:off x="2295114" y="3686504"/>
+            <a:ext cx="1419358" cy="2743115"/>
+          </a:xfrm>
+          <a:prstGeom prst="bentConnector5">
+            <a:avLst>
+              <a:gd name="adj1" fmla="val -16106"/>
+              <a:gd name="adj2" fmla="val 35133"/>
+              <a:gd name="adj3" fmla="val 116106"/>
+            </a:avLst>
+          </a:prstGeom>
+          <a:ln>
+            <a:tailEnd type="triangle"/>
+          </a:ln>
+        </p:spPr>
+        <p:style>
+          <a:lnRef idx="1">
+            <a:schemeClr val="accent1"/>
+          </a:lnRef>
+          <a:fillRef idx="0">
+            <a:schemeClr val="accent1"/>
+          </a:fillRef>
+          <a:effectRef idx="0">
+            <a:schemeClr val="accent1"/>
+          </a:effectRef>
+          <a:fontRef idx="minor">
+            <a:schemeClr val="tx1"/>
+          </a:fontRef>
+        </p:style>
+      </p:cxnSp>
+      <p:cxnSp>
+        <p:nvCxnSpPr>
+          <p:cNvPr id="143" name="Connector: Elbow 142">
+            <a:extLst>
+              <a:ext uri="{FF2B5EF4-FFF2-40B4-BE49-F238E27FC236}">
+                <a16:creationId xmlns:a16="http://schemas.microsoft.com/office/drawing/2014/main" id="{6474ED06-91CE-40D6-859F-D4611E383E93}"/>
+              </a:ext>
+            </a:extLst>
+          </p:cNvPr>
+          <p:cNvCxnSpPr>
+            <a:cxnSpLocks/>
+            <a:stCxn id="138" idx="3"/>
+            <a:endCxn id="47" idx="1"/>
+          </p:cNvCxnSpPr>
+          <p:nvPr/>
+        </p:nvCxnSpPr>
+        <p:spPr>
+          <a:xfrm flipV="1">
+            <a:off x="3513295" y="4567519"/>
+            <a:ext cx="1183250" cy="1862100"/>
+          </a:xfrm>
+          <a:prstGeom prst="bentConnector3">
+            <a:avLst>
+              <a:gd name="adj1" fmla="val 50000"/>
+            </a:avLst>
+          </a:prstGeom>
+          <a:ln>
+            <a:tailEnd type="triangle"/>
+          </a:ln>
+        </p:spPr>
+        <p:style>
+          <a:lnRef idx="1">
+            <a:schemeClr val="accent1"/>
+          </a:lnRef>
+          <a:fillRef idx="0">
+            <a:schemeClr val="accent1"/>
+          </a:fillRef>
+          <a:effectRef idx="0">
+            <a:schemeClr val="accent1"/>
+          </a:effectRef>
+          <a:fontRef idx="minor">
+            <a:schemeClr val="tx1"/>
+          </a:fontRef>
+        </p:style>
+      </p:cxnSp>
+      <p:cxnSp>
+        <p:nvCxnSpPr>
+          <p:cNvPr id="146" name="Connector: Elbow 145">
+            <a:extLst>
+              <a:ext uri="{FF2B5EF4-FFF2-40B4-BE49-F238E27FC236}">
+                <a16:creationId xmlns:a16="http://schemas.microsoft.com/office/drawing/2014/main" id="{18511CE0-BD61-4327-9E6E-62B2FDCC7C07}"/>
+              </a:ext>
+            </a:extLst>
+          </p:cNvPr>
+          <p:cNvCxnSpPr>
+            <a:cxnSpLocks/>
+            <a:stCxn id="138" idx="3"/>
+            <a:endCxn id="82" idx="1"/>
+          </p:cNvCxnSpPr>
+          <p:nvPr/>
+        </p:nvCxnSpPr>
+        <p:spPr>
+          <a:xfrm flipV="1">
+            <a:off x="3513295" y="2626659"/>
+            <a:ext cx="1183250" cy="3802960"/>
+          </a:xfrm>
+          <a:prstGeom prst="bentConnector3">
+            <a:avLst>
+              <a:gd name="adj1" fmla="val 50000"/>
             </a:avLst>
           </a:prstGeom>
           <a:ln>

</xml_diff>